<commit_message>
Update Word and PowerPoint templates with List of Tables support
Add List of Tables section to Word template for auto-generated table lists.
Update PowerPoint template with latest design refinements.

These templates are required for the enhanced document generation features
introduced in the previous commit (dynamic captions and updatable lists).
</commit_message>
<xml_diff>
--- a/support/doc-templates/powerpoint/EOFramework-Template-01.pptx
+++ b/support/doc-templates/powerpoint/EOFramework-Template-01.pptx
@@ -5,14 +5,16 @@
     <p:sldMasterId id="2147483648" r:id="rId1"/>
   </p:sldMasterIdLst>
   <p:notesMasterIdLst>
-    <p:notesMasterId r:id="rId7"/>
+    <p:notesMasterId r:id="rId9"/>
   </p:notesMasterIdLst>
   <p:sldIdLst>
     <p:sldId id="256" r:id="rId2"/>
-    <p:sldId id="260" r:id="rId3"/>
-    <p:sldId id="257" r:id="rId4"/>
-    <p:sldId id="258" r:id="rId5"/>
-    <p:sldId id="259" r:id="rId6"/>
+    <p:sldId id="261" r:id="rId3"/>
+    <p:sldId id="260" r:id="rId4"/>
+    <p:sldId id="257" r:id="rId5"/>
+    <p:sldId id="258" r:id="rId6"/>
+    <p:sldId id="259" r:id="rId7"/>
+    <p:sldId id="262" r:id="rId8"/>
   </p:sldIdLst>
   <p:sldSz cx="9144000" cy="5143500" type="screen16x9"/>
   <p:notesSz cx="5143500" cy="9144000"/>
@@ -880,7 +882,7 @@
 
 <file path=ppt/slideLayouts/slideLayout3.xml><?xml version="1.0" encoding="utf-8"?>
 <p:sldLayout xmlns:a="http://schemas.openxmlformats.org/drawingml/2006/main" xmlns:r="http://schemas.openxmlformats.org/officeDocument/2006/relationships" xmlns:p="http://schemas.openxmlformats.org/presentationml/2006/main" preserve="1" userDrawn="1">
-  <p:cSld name="EO Two Column">
+  <p:cSld name="EO Bullet Points">
     <p:spTree>
       <p:nvGrpSpPr>
         <p:cNvPr id="1" name=""/>
@@ -949,8 +951,8 @@
         </p:nvSpPr>
         <p:spPr>
           <a:xfrm>
-            <a:off x="257174" y="7163"/>
-            <a:ext cx="8530738" cy="527013"/>
+            <a:off x="296863" y="0"/>
+            <a:ext cx="8509304" cy="527008"/>
           </a:xfrm>
           <a:prstGeom prst="rect">
             <a:avLst/>
@@ -984,6 +986,258 @@
             <a:pPr lvl="0"/>
             <a:r>
               <a:rPr lang="en-US" dirty="0"/>
+              <a:t>Bullet Points</a:t>
+            </a:r>
+          </a:p>
+        </p:txBody>
+      </p:sp>
+      <p:sp>
+        <p:nvSpPr>
+          <p:cNvPr id="12" name="Picture Placeholder 13">
+            <a:extLst>
+              <a:ext uri="{FF2B5EF4-FFF2-40B4-BE49-F238E27FC236}">
+                <a16:creationId xmlns:a16="http://schemas.microsoft.com/office/drawing/2014/main" id="{2DB97592-C4D5-B315-7F11-AA14F6EE8A62}"/>
+              </a:ext>
+            </a:extLst>
+          </p:cNvPr>
+          <p:cNvSpPr>
+            <a:spLocks noGrp="1"/>
+          </p:cNvSpPr>
+          <p:nvPr>
+            <p:ph type="pic" sz="quarter" idx="13"/>
+          </p:nvPr>
+        </p:nvSpPr>
+        <p:spPr>
+          <a:xfrm>
+            <a:off x="313593" y="4536078"/>
+            <a:ext cx="2143858" cy="529698"/>
+          </a:xfrm>
+          <a:prstGeom prst="rect">
+            <a:avLst/>
+          </a:prstGeom>
+        </p:spPr>
+        <p:txBody>
+          <a:bodyPr/>
+          <a:lstStyle/>
+          <a:p>
+            <a:endParaRPr lang="en-US" dirty="0"/>
+          </a:p>
+        </p:txBody>
+      </p:sp>
+      <p:pic>
+        <p:nvPicPr>
+          <p:cNvPr id="13" name="Image 0" descr="/home/claude/eo-framework-logo.png">
+            <a:extLst>
+              <a:ext uri="{FF2B5EF4-FFF2-40B4-BE49-F238E27FC236}">
+                <a16:creationId xmlns:a16="http://schemas.microsoft.com/office/drawing/2014/main" id="{25116040-BB88-891D-9118-628A78E99872}"/>
+              </a:ext>
+            </a:extLst>
+          </p:cNvPr>
+          <p:cNvPicPr>
+            <a:picLocks noChangeAspect="1"/>
+          </p:cNvPicPr>
+          <p:nvPr userDrawn="1"/>
+        </p:nvPicPr>
+        <p:blipFill>
+          <a:blip r:embed="rId2"/>
+          <a:stretch>
+            <a:fillRect/>
+          </a:stretch>
+        </p:blipFill>
+        <p:spPr>
+          <a:xfrm>
+            <a:off x="6945879" y="4648200"/>
+            <a:ext cx="1952244" cy="417576"/>
+          </a:xfrm>
+          <a:prstGeom prst="rect">
+            <a:avLst/>
+          </a:prstGeom>
+        </p:spPr>
+      </p:pic>
+      <p:sp>
+        <p:nvSpPr>
+          <p:cNvPr id="4" name="Text Placeholder 3">
+            <a:extLst>
+              <a:ext uri="{FF2B5EF4-FFF2-40B4-BE49-F238E27FC236}">
+                <a16:creationId xmlns:a16="http://schemas.microsoft.com/office/drawing/2014/main" id="{54BEE1A0-720D-187D-95F8-429F3DF3D64E}"/>
+              </a:ext>
+            </a:extLst>
+          </p:cNvPr>
+          <p:cNvSpPr>
+            <a:spLocks noGrp="1"/>
+          </p:cNvSpPr>
+          <p:nvPr>
+            <p:ph type="body" sz="quarter" idx="14" hasCustomPrompt="1"/>
+          </p:nvPr>
+        </p:nvSpPr>
+        <p:spPr>
+          <a:xfrm>
+            <a:off x="296863" y="685601"/>
+            <a:ext cx="8548687" cy="3811657"/>
+          </a:xfrm>
+          <a:prstGeom prst="rect">
+            <a:avLst/>
+          </a:prstGeom>
+        </p:spPr>
+        <p:txBody>
+          <a:bodyPr/>
+          <a:lstStyle>
+            <a:lvl1pPr>
+              <a:defRPr sz="2000" baseline="0">
+                <a:solidFill>
+                  <a:schemeClr val="tx1"/>
+                </a:solidFill>
+              </a:defRPr>
+            </a:lvl1pPr>
+            <a:lvl2pPr>
+              <a:buFont typeface="Arial" panose="020B0604020202020204" pitchFamily="34" charset="0"/>
+              <a:buChar char="•"/>
+              <a:defRPr sz="1600"/>
+            </a:lvl2pPr>
+            <a:lvl3pPr>
+              <a:defRPr sz="1400"/>
+            </a:lvl3pPr>
+            <a:lvl4pPr>
+              <a:buFont typeface="Arial" panose="020B0604020202020204" pitchFamily="34" charset="0"/>
+              <a:buChar char="•"/>
+              <a:defRPr sz="1200"/>
+            </a:lvl4pPr>
+          </a:lstStyle>
+          <a:p>
+            <a:pPr lvl="0"/>
+            <a:r>
+              <a:rPr lang="en-US" dirty="0"/>
+              <a:t>Bullet Point 1</a:t>
+            </a:r>
+          </a:p>
+          <a:p>
+            <a:pPr lvl="0"/>
+            <a:r>
+              <a:rPr lang="en-US" dirty="0"/>
+              <a:t>Bullet Point 2</a:t>
+            </a:r>
+          </a:p>
+        </p:txBody>
+      </p:sp>
+    </p:spTree>
+    <p:extLst>
+      <p:ext uri="{BB962C8B-B14F-4D97-AF65-F5344CB8AC3E}">
+        <p14:creationId xmlns:p14="http://schemas.microsoft.com/office/powerpoint/2010/main" val="1090737763"/>
+      </p:ext>
+    </p:extLst>
+  </p:cSld>
+  <p:clrMapOvr>
+    <a:masterClrMapping/>
+  </p:clrMapOvr>
+</p:sldLayout>
+</file>
+
+<file path=ppt/slideLayouts/slideLayout4.xml><?xml version="1.0" encoding="utf-8"?>
+<p:sldLayout xmlns:a="http://schemas.openxmlformats.org/drawingml/2006/main" xmlns:r="http://schemas.openxmlformats.org/officeDocument/2006/relationships" xmlns:p="http://schemas.openxmlformats.org/presentationml/2006/main" preserve="1" userDrawn="1">
+  <p:cSld name="EO Two Column">
+    <p:spTree>
+      <p:nvGrpSpPr>
+        <p:cNvPr id="1" name=""/>
+        <p:cNvGrpSpPr/>
+        <p:nvPr/>
+      </p:nvGrpSpPr>
+      <p:grpSpPr>
+        <a:xfrm>
+          <a:off x="0" y="0"/>
+          <a:ext cx="0" cy="0"/>
+          <a:chOff x="0" y="0"/>
+          <a:chExt cx="0" cy="0"/>
+        </a:xfrm>
+      </p:grpSpPr>
+      <p:sp>
+        <p:nvSpPr>
+          <p:cNvPr id="3" name="Shape 1">
+            <a:extLst>
+              <a:ext uri="{FF2B5EF4-FFF2-40B4-BE49-F238E27FC236}">
+                <a16:creationId xmlns:a16="http://schemas.microsoft.com/office/drawing/2014/main" id="{4EA828A1-D5D6-9ADA-1918-E5FE226673A0}"/>
+              </a:ext>
+            </a:extLst>
+          </p:cNvPr>
+          <p:cNvSpPr/>
+          <p:nvPr userDrawn="1"/>
+        </p:nvSpPr>
+        <p:spPr>
+          <a:xfrm>
+            <a:off x="0" y="606304"/>
+            <a:ext cx="9144000" cy="0"/>
+          </a:xfrm>
+          <a:prstGeom prst="line">
+            <a:avLst/>
+          </a:prstGeom>
+          <a:noFill/>
+          <a:ln w="28575">
+            <a:solidFill>
+              <a:srgbClr val="CC0000"/>
+            </a:solidFill>
+            <a:prstDash val="solid"/>
+          </a:ln>
+        </p:spPr>
+        <p:txBody>
+          <a:bodyPr/>
+          <a:lstStyle/>
+          <a:p>
+            <a:endParaRPr lang="en-US"/>
+          </a:p>
+        </p:txBody>
+      </p:sp>
+      <p:sp>
+        <p:nvSpPr>
+          <p:cNvPr id="9" name="Text Placeholder 8">
+            <a:extLst>
+              <a:ext uri="{FF2B5EF4-FFF2-40B4-BE49-F238E27FC236}">
+                <a16:creationId xmlns:a16="http://schemas.microsoft.com/office/drawing/2014/main" id="{980A86D4-478F-6846-9F0A-B815F2A3AB2D}"/>
+              </a:ext>
+            </a:extLst>
+          </p:cNvPr>
+          <p:cNvSpPr>
+            <a:spLocks noGrp="1"/>
+          </p:cNvSpPr>
+          <p:nvPr>
+            <p:ph type="body" sz="quarter" idx="10" hasCustomPrompt="1"/>
+          </p:nvPr>
+        </p:nvSpPr>
+        <p:spPr>
+          <a:xfrm>
+            <a:off x="257174" y="7163"/>
+            <a:ext cx="8530738" cy="527013"/>
+          </a:xfrm>
+          <a:prstGeom prst="rect">
+            <a:avLst/>
+          </a:prstGeom>
+        </p:spPr>
+        <p:txBody>
+          <a:bodyPr/>
+          <a:lstStyle>
+            <a:lvl1pPr marL="0" marR="0" indent="0" algn="l" defTabSz="914400" rtl="0" eaLnBrk="1" fontAlgn="auto" latinLnBrk="0" hangingPunct="1">
+              <a:lnSpc>
+                <a:spcPct val="100000"/>
+              </a:lnSpc>
+              <a:spcBef>
+                <a:spcPct val="20000"/>
+              </a:spcBef>
+              <a:spcAft>
+                <a:spcPts val="0"/>
+              </a:spcAft>
+              <a:buClrTx/>
+              <a:buSzTx/>
+              <a:buFont typeface="Arial" pitchFamily="34" charset="0"/>
+              <a:buNone/>
+              <a:tabLst/>
+              <a:defRPr sz="2700" b="1">
+                <a:latin typeface="Arial" panose="020B0604020202020204" pitchFamily="34" charset="0"/>
+                <a:cs typeface="Arial" panose="020B0604020202020204" pitchFamily="34" charset="0"/>
+              </a:defRPr>
+            </a:lvl1pPr>
+          </a:lstStyle>
+          <a:p>
+            <a:pPr lvl="0"/>
+            <a:r>
+              <a:rPr lang="en-US" dirty="0"/>
               <a:t>Two Column Layout</a:t>
             </a:r>
           </a:p>
@@ -1235,7 +1489,7 @@
 </p:sldLayout>
 </file>
 
-<file path=ppt/slideLayouts/slideLayout4.xml><?xml version="1.0" encoding="utf-8"?>
+<file path=ppt/slideLayouts/slideLayout5.xml><?xml version="1.0" encoding="utf-8"?>
 <p:sldLayout xmlns:a="http://schemas.openxmlformats.org/drawingml/2006/main" xmlns:r="http://schemas.openxmlformats.org/officeDocument/2006/relationships" xmlns:p="http://schemas.openxmlformats.org/presentationml/2006/main" preserve="1" userDrawn="1">
   <p:cSld name="EO Table">
     <p:spTree>
@@ -1482,7 +1736,7 @@
 </p:sldLayout>
 </file>
 
-<file path=ppt/slideLayouts/slideLayout5.xml><?xml version="1.0" encoding="utf-8"?>
+<file path=ppt/slideLayouts/slideLayout6.xml><?xml version="1.0" encoding="utf-8"?>
 <p:sldLayout xmlns:a="http://schemas.openxmlformats.org/drawingml/2006/main" xmlns:r="http://schemas.openxmlformats.org/officeDocument/2006/relationships" xmlns:p="http://schemas.openxmlformats.org/presentationml/2006/main" preserve="1" userDrawn="1">
   <p:cSld name="EO Visual Content">
     <p:spTree>
@@ -1787,7 +2041,7 @@
 </p:sldLayout>
 </file>
 
-<file path=ppt/slideLayouts/slideLayout6.xml><?xml version="1.0" encoding="utf-8"?>
+<file path=ppt/slideLayouts/slideLayout7.xml><?xml version="1.0" encoding="utf-8"?>
 <p:sldLayout xmlns:a="http://schemas.openxmlformats.org/drawingml/2006/main" xmlns:r="http://schemas.openxmlformats.org/officeDocument/2006/relationships" xmlns:p="http://schemas.openxmlformats.org/presentationml/2006/main" preserve="1" userDrawn="1">
   <p:cSld name="EO Data Visualization">
     <p:spTree>
@@ -2092,7 +2346,7 @@
 </p:sldLayout>
 </file>
 
-<file path=ppt/slideLayouts/slideLayout7.xml><?xml version="1.0" encoding="utf-8"?>
+<file path=ppt/slideLayouts/slideLayout8.xml><?xml version="1.0" encoding="utf-8"?>
 <p:sldLayout xmlns:a="http://schemas.openxmlformats.org/drawingml/2006/main" xmlns:r="http://schemas.openxmlformats.org/officeDocument/2006/relationships" xmlns:p="http://schemas.openxmlformats.org/presentationml/2006/main" preserve="1" userDrawn="1">
   <p:cSld name="EO Thank You">
     <p:spTree>
@@ -2190,7 +2444,7 @@
         </p:nvSpPr>
         <p:spPr>
           <a:xfrm>
-            <a:off x="538528" y="1886679"/>
+            <a:off x="736356" y="2247927"/>
             <a:ext cx="7671288" cy="527050"/>
           </a:xfrm>
           <a:prstGeom prst="rect">
@@ -2228,6 +2482,14 @@
               </a:rPr>
               <a:t>Thank You</a:t>
             </a:r>
+          </a:p>
+          <a:p>
+            <a:pPr marL="0" indent="0" algn="ctr">
+              <a:lnSpc>
+                <a:spcPts val="3600"/>
+              </a:lnSpc>
+              <a:buNone/>
+            </a:pPr>
             <a:endParaRPr lang="en-US" sz="3600" dirty="0"/>
           </a:p>
         </p:txBody>
@@ -2321,7 +2583,7 @@
         </p:nvSpPr>
         <p:spPr>
           <a:xfrm>
-            <a:off x="1059473" y="2437679"/>
+            <a:off x="1024304" y="1874962"/>
             <a:ext cx="6629399" cy="334598"/>
           </a:xfrm>
           <a:prstGeom prst="rect">
@@ -2482,6 +2744,83 @@
                 </a:schemeClr>
               </a:solidFill>
             </a:endParaRPr>
+          </a:p>
+        </p:txBody>
+      </p:sp>
+      <p:sp>
+        <p:nvSpPr>
+          <p:cNvPr id="16" name="Text Placeholder 9">
+            <a:extLst>
+              <a:ext uri="{FF2B5EF4-FFF2-40B4-BE49-F238E27FC236}">
+                <a16:creationId xmlns:a16="http://schemas.microsoft.com/office/drawing/2014/main" id="{2DED039B-C555-DCF4-1CA7-CA1E44823784}"/>
+              </a:ext>
+            </a:extLst>
+          </p:cNvPr>
+          <p:cNvSpPr>
+            <a:spLocks noGrp="1"/>
+          </p:cNvSpPr>
+          <p:nvPr>
+            <p:ph type="body" sz="quarter" idx="15" hasCustomPrompt="1"/>
+          </p:nvPr>
+        </p:nvSpPr>
+        <p:spPr>
+          <a:xfrm>
+            <a:off x="268165" y="3131272"/>
+            <a:ext cx="8480181" cy="334598"/>
+          </a:xfrm>
+          <a:prstGeom prst="rect">
+            <a:avLst/>
+          </a:prstGeom>
+        </p:spPr>
+        <p:txBody>
+          <a:bodyPr/>
+          <a:lstStyle>
+            <a:lvl1pPr marL="0" marR="0" indent="0" algn="ctr" defTabSz="914400" rtl="0" eaLnBrk="1" fontAlgn="auto" latinLnBrk="0" hangingPunct="1">
+              <a:lnSpc>
+                <a:spcPct val="100000"/>
+              </a:lnSpc>
+              <a:spcBef>
+                <a:spcPct val="20000"/>
+              </a:spcBef>
+              <a:spcAft>
+                <a:spcPts val="0"/>
+              </a:spcAft>
+              <a:buClrTx/>
+              <a:buSzTx/>
+              <a:buFont typeface="Arial" pitchFamily="34" charset="0"/>
+              <a:buNone/>
+              <a:tabLst/>
+              <a:defRPr sz="1800" b="0">
+                <a:solidFill>
+                  <a:schemeClr val="tx1"/>
+                </a:solidFill>
+                <a:latin typeface="Arial" panose="020B0604020202020204" pitchFamily="34" charset="0"/>
+                <a:cs typeface="Arial" panose="020B0604020202020204" pitchFamily="34" charset="0"/>
+              </a:defRPr>
+            </a:lvl1pPr>
+          </a:lstStyle>
+          <a:p>
+            <a:pPr>
+              <a:spcAft>
+                <a:spcPts val="1200"/>
+              </a:spcAft>
+            </a:pPr>
+            <a:r>
+              <a:rPr lang="en-US" sz="1800" b="1" dirty="0">
+                <a:solidFill>
+                  <a:srgbClr val="000000"/>
+                </a:solidFill>
+              </a:rPr>
+              <a:t>Account Manager:</a:t>
+            </a:r>
+            <a:r>
+              <a:rPr lang="en-US" sz="1800" dirty="0">
+                <a:solidFill>
+                  <a:srgbClr val="000000"/>
+                </a:solidFill>
+              </a:rPr>
+              <a:t> [Name, Title] | [Email] | [Phone]</a:t>
+            </a:r>
           </a:p>
         </p:txBody>
       </p:sp>
@@ -2526,11 +2865,12 @@
   <p:sldLayoutIdLst>
     <p:sldLayoutId id="2147483651" r:id="rId1"/>
     <p:sldLayoutId id="2147483653" r:id="rId2"/>
-    <p:sldLayoutId id="2147483654" r:id="rId3"/>
-    <p:sldLayoutId id="2147483655" r:id="rId4"/>
-    <p:sldLayoutId id="2147483656" r:id="rId5"/>
-    <p:sldLayoutId id="2147483657" r:id="rId6"/>
-    <p:sldLayoutId id="2147483658" r:id="rId7"/>
+    <p:sldLayoutId id="2147483659" r:id="rId3"/>
+    <p:sldLayoutId id="2147483654" r:id="rId4"/>
+    <p:sldLayoutId id="2147483655" r:id="rId5"/>
+    <p:sldLayoutId id="2147483656" r:id="rId6"/>
+    <p:sldLayoutId id="2147483657" r:id="rId7"/>
+    <p:sldLayoutId id="2147483658" r:id="rId8"/>
   </p:sldLayoutIdLst>
   <p:hf sldNum="0" hdr="0" ftr="0" dt="0"/>
   <p:txStyles>
@@ -2969,6 +3309,120 @@
           <p:cNvPr id="2" name="Text Placeholder 1">
             <a:extLst>
               <a:ext uri="{FF2B5EF4-FFF2-40B4-BE49-F238E27FC236}">
+                <a16:creationId xmlns:a16="http://schemas.microsoft.com/office/drawing/2014/main" id="{AB126D49-1C4E-FDB3-6E1A-112904E10ABD}"/>
+              </a:ext>
+            </a:extLst>
+          </p:cNvPr>
+          <p:cNvSpPr>
+            <a:spLocks noGrp="1"/>
+          </p:cNvSpPr>
+          <p:nvPr>
+            <p:ph type="body" sz="quarter" idx="10"/>
+          </p:nvPr>
+        </p:nvSpPr>
+        <p:spPr/>
+        <p:txBody>
+          <a:bodyPr/>
+          <a:lstStyle/>
+          <a:p>
+            <a:endParaRPr lang="en-US"/>
+          </a:p>
+        </p:txBody>
+      </p:sp>
+      <p:sp>
+        <p:nvSpPr>
+          <p:cNvPr id="3" name="Picture Placeholder 2">
+            <a:extLst>
+              <a:ext uri="{FF2B5EF4-FFF2-40B4-BE49-F238E27FC236}">
+                <a16:creationId xmlns:a16="http://schemas.microsoft.com/office/drawing/2014/main" id="{A0B7802D-34EB-3EAA-68EB-8A347BB76DA2}"/>
+              </a:ext>
+            </a:extLst>
+          </p:cNvPr>
+          <p:cNvSpPr>
+            <a:spLocks noGrp="1"/>
+          </p:cNvSpPr>
+          <p:nvPr>
+            <p:ph type="pic" sz="quarter" idx="13"/>
+          </p:nvPr>
+        </p:nvSpPr>
+        <p:spPr/>
+        <p:txBody>
+          <a:bodyPr/>
+          <a:lstStyle/>
+          <a:p>
+            <a:endParaRPr lang="en-US"/>
+          </a:p>
+        </p:txBody>
+      </p:sp>
+      <p:sp>
+        <p:nvSpPr>
+          <p:cNvPr id="4" name="Text Placeholder 3">
+            <a:extLst>
+              <a:ext uri="{FF2B5EF4-FFF2-40B4-BE49-F238E27FC236}">
+                <a16:creationId xmlns:a16="http://schemas.microsoft.com/office/drawing/2014/main" id="{416AF6C2-651C-837E-987A-209F503FE545}"/>
+              </a:ext>
+            </a:extLst>
+          </p:cNvPr>
+          <p:cNvSpPr>
+            <a:spLocks noGrp="1"/>
+          </p:cNvSpPr>
+          <p:nvPr>
+            <p:ph type="body" sz="quarter" idx="14"/>
+          </p:nvPr>
+        </p:nvSpPr>
+        <p:spPr/>
+        <p:txBody>
+          <a:bodyPr/>
+          <a:lstStyle/>
+          <a:p>
+            <a:r>
+              <a:rPr lang="en-US" dirty="0"/>
+              <a:t>Point 1</a:t>
+            </a:r>
+          </a:p>
+          <a:p>
+            <a:r>
+              <a:rPr lang="en-US" dirty="0"/>
+              <a:t>Point 2</a:t>
+            </a:r>
+          </a:p>
+        </p:txBody>
+      </p:sp>
+    </p:spTree>
+    <p:extLst>
+      <p:ext uri="{BB962C8B-B14F-4D97-AF65-F5344CB8AC3E}">
+        <p14:creationId xmlns:p14="http://schemas.microsoft.com/office/powerpoint/2010/main" val="2297706068"/>
+      </p:ext>
+    </p:extLst>
+  </p:cSld>
+  <p:clrMapOvr>
+    <a:masterClrMapping/>
+  </p:clrMapOvr>
+</p:sld>
+</file>
+
+<file path=ppt/slides/slide3.xml><?xml version="1.0" encoding="utf-8"?>
+<p:sld xmlns:a="http://schemas.openxmlformats.org/drawingml/2006/main" xmlns:r="http://schemas.openxmlformats.org/officeDocument/2006/relationships" xmlns:p="http://schemas.openxmlformats.org/presentationml/2006/main">
+  <p:cSld>
+    <p:spTree>
+      <p:nvGrpSpPr>
+        <p:cNvPr id="1" name=""/>
+        <p:cNvGrpSpPr/>
+        <p:nvPr/>
+      </p:nvGrpSpPr>
+      <p:grpSpPr>
+        <a:xfrm>
+          <a:off x="0" y="0"/>
+          <a:ext cx="0" cy="0"/>
+          <a:chOff x="0" y="0"/>
+          <a:chExt cx="0" cy="0"/>
+        </a:xfrm>
+      </p:grpSpPr>
+      <p:sp>
+        <p:nvSpPr>
+          <p:cNvPr id="2" name="Text Placeholder 1">
+            <a:extLst>
+              <a:ext uri="{FF2B5EF4-FFF2-40B4-BE49-F238E27FC236}">
                 <a16:creationId xmlns:a16="http://schemas.microsoft.com/office/drawing/2014/main" id="{213C3128-D9A0-FDF5-5D3B-B79BB6F2EF1B}"/>
               </a:ext>
             </a:extLst>
@@ -4754,121 +5208,6 @@
 </p:sld>
 </file>
 
-<file path=ppt/slides/slide3.xml><?xml version="1.0" encoding="utf-8"?>
-<p:sld xmlns:a="http://schemas.openxmlformats.org/drawingml/2006/main" xmlns:r="http://schemas.openxmlformats.org/officeDocument/2006/relationships" xmlns:p="http://schemas.openxmlformats.org/presentationml/2006/main">
-  <p:cSld>
-    <p:spTree>
-      <p:nvGrpSpPr>
-        <p:cNvPr id="1" name=""/>
-        <p:cNvGrpSpPr/>
-        <p:nvPr/>
-      </p:nvGrpSpPr>
-      <p:grpSpPr>
-        <a:xfrm>
-          <a:off x="0" y="0"/>
-          <a:ext cx="0" cy="0"/>
-          <a:chOff x="0" y="0"/>
-          <a:chExt cx="0" cy="0"/>
-        </a:xfrm>
-      </p:grpSpPr>
-      <p:sp>
-        <p:nvSpPr>
-          <p:cNvPr id="2" name="Text Placeholder 1">
-            <a:extLst>
-              <a:ext uri="{FF2B5EF4-FFF2-40B4-BE49-F238E27FC236}">
-                <a16:creationId xmlns:a16="http://schemas.microsoft.com/office/drawing/2014/main" id="{2AE8C365-43E6-1A6D-CC77-30309B6F4CFD}"/>
-              </a:ext>
-            </a:extLst>
-          </p:cNvPr>
-          <p:cNvSpPr>
-            <a:spLocks noGrp="1"/>
-          </p:cNvSpPr>
-          <p:nvPr>
-            <p:ph type="body" sz="quarter" idx="10"/>
-          </p:nvPr>
-        </p:nvSpPr>
-        <p:spPr/>
-        <p:txBody>
-          <a:bodyPr/>
-          <a:lstStyle/>
-          <a:p>
-            <a:endParaRPr lang="en-US" dirty="0"/>
-          </a:p>
-        </p:txBody>
-      </p:sp>
-      <p:sp>
-        <p:nvSpPr>
-          <p:cNvPr id="3" name="Picture Placeholder 2">
-            <a:extLst>
-              <a:ext uri="{FF2B5EF4-FFF2-40B4-BE49-F238E27FC236}">
-                <a16:creationId xmlns:a16="http://schemas.microsoft.com/office/drawing/2014/main" id="{233C1983-D8C1-8A49-699F-A33711A4966B}"/>
-              </a:ext>
-            </a:extLst>
-          </p:cNvPr>
-          <p:cNvSpPr>
-            <a:spLocks noGrp="1"/>
-          </p:cNvSpPr>
-          <p:nvPr>
-            <p:ph type="pic" sz="quarter" idx="13"/>
-          </p:nvPr>
-        </p:nvSpPr>
-        <p:spPr/>
-        <p:txBody>
-          <a:bodyPr/>
-          <a:lstStyle/>
-          <a:p>
-            <a:endParaRPr lang="en-US"/>
-          </a:p>
-        </p:txBody>
-      </p:sp>
-      <p:sp>
-        <p:nvSpPr>
-          <p:cNvPr id="4" name="Text Placeholder 3">
-            <a:extLst>
-              <a:ext uri="{FF2B5EF4-FFF2-40B4-BE49-F238E27FC236}">
-                <a16:creationId xmlns:a16="http://schemas.microsoft.com/office/drawing/2014/main" id="{4D33BEF2-B18B-04AF-5845-DEE02C195164}"/>
-              </a:ext>
-            </a:extLst>
-          </p:cNvPr>
-          <p:cNvSpPr>
-            <a:spLocks noGrp="1"/>
-          </p:cNvSpPr>
-          <p:nvPr>
-            <p:ph type="body" sz="quarter" idx="14"/>
-          </p:nvPr>
-        </p:nvSpPr>
-        <p:spPr/>
-        <p:txBody>
-          <a:bodyPr/>
-          <a:lstStyle/>
-          <a:p>
-            <a:r>
-              <a:rPr lang="en-US" dirty="0"/>
-              <a:t>Title 1</a:t>
-            </a:r>
-          </a:p>
-          <a:p>
-            <a:pPr lvl="1"/>
-            <a:r>
-              <a:rPr lang="en-US" dirty="0"/>
-              <a:t>Text 2</a:t>
-            </a:r>
-          </a:p>
-        </p:txBody>
-      </p:sp>
-    </p:spTree>
-    <p:extLst>
-      <p:ext uri="{BB962C8B-B14F-4D97-AF65-F5344CB8AC3E}">
-        <p14:creationId xmlns:p14="http://schemas.microsoft.com/office/powerpoint/2010/main" val="2420498469"/>
-      </p:ext>
-    </p:extLst>
-  </p:cSld>
-  <p:clrMapOvr>
-    <a:masterClrMapping/>
-  </p:clrMapOvr>
-</p:sld>
-</file>
-
 <file path=ppt/slides/slide4.xml><?xml version="1.0" encoding="utf-8"?>
 <p:sld xmlns:a="http://schemas.openxmlformats.org/drawingml/2006/main" xmlns:r="http://schemas.openxmlformats.org/officeDocument/2006/relationships" xmlns:p="http://schemas.openxmlformats.org/presentationml/2006/main">
   <p:cSld>
@@ -4891,7 +5230,7 @@
           <p:cNvPr id="2" name="Text Placeholder 1">
             <a:extLst>
               <a:ext uri="{FF2B5EF4-FFF2-40B4-BE49-F238E27FC236}">
-                <a16:creationId xmlns:a16="http://schemas.microsoft.com/office/drawing/2014/main" id="{D0CBB279-7909-5F96-1E44-5BCBE95CD5D4}"/>
+                <a16:creationId xmlns:a16="http://schemas.microsoft.com/office/drawing/2014/main" id="{2AE8C365-43E6-1A6D-CC77-30309B6F4CFD}"/>
               </a:ext>
             </a:extLst>
           </p:cNvPr>
@@ -4907,7 +5246,7 @@
           <a:bodyPr/>
           <a:lstStyle/>
           <a:p>
-            <a:endParaRPr lang="en-US"/>
+            <a:endParaRPr lang="en-US" dirty="0"/>
           </a:p>
         </p:txBody>
       </p:sp>
@@ -4916,7 +5255,7 @@
           <p:cNvPr id="3" name="Picture Placeholder 2">
             <a:extLst>
               <a:ext uri="{FF2B5EF4-FFF2-40B4-BE49-F238E27FC236}">
-                <a16:creationId xmlns:a16="http://schemas.microsoft.com/office/drawing/2014/main" id="{614EE281-F536-071D-3D0A-724F14AEC19B}"/>
+                <a16:creationId xmlns:a16="http://schemas.microsoft.com/office/drawing/2014/main" id="{233C1983-D8C1-8A49-699F-A33711A4966B}"/>
               </a:ext>
             </a:extLst>
           </p:cNvPr>
@@ -4924,7 +5263,7 @@
             <a:spLocks noGrp="1"/>
           </p:cNvSpPr>
           <p:nvPr>
-            <p:ph type="pic" sz="quarter" idx="14"/>
+            <p:ph type="pic" sz="quarter" idx="13"/>
           </p:nvPr>
         </p:nvSpPr>
         <p:spPr/>
@@ -4941,7 +5280,7 @@
           <p:cNvPr id="4" name="Text Placeholder 3">
             <a:extLst>
               <a:ext uri="{FF2B5EF4-FFF2-40B4-BE49-F238E27FC236}">
-                <a16:creationId xmlns:a16="http://schemas.microsoft.com/office/drawing/2014/main" id="{12DF0132-01D6-E174-2D90-F7A6BD857557}"/>
+                <a16:creationId xmlns:a16="http://schemas.microsoft.com/office/drawing/2014/main" id="{4D33BEF2-B18B-04AF-5845-DEE02C195164}"/>
               </a:ext>
             </a:extLst>
           </p:cNvPr>
@@ -4949,7 +5288,7 @@
             <a:spLocks noGrp="1"/>
           </p:cNvSpPr>
           <p:nvPr>
-            <p:ph type="body" sz="quarter" idx="16"/>
+            <p:ph type="body" sz="quarter" idx="14"/>
           </p:nvPr>
         </p:nvSpPr>
         <p:spPr/>
@@ -4959,42 +5298,7 @@
           <a:p>
             <a:r>
               <a:rPr lang="en-US" dirty="0"/>
-              <a:t>Left Column</a:t>
-            </a:r>
-          </a:p>
-          <a:p>
-            <a:pPr lvl="1"/>
-            <a:r>
-              <a:rPr lang="en-US" dirty="0"/>
-              <a:t>Text 1</a:t>
-            </a:r>
-          </a:p>
-        </p:txBody>
-      </p:sp>
-      <p:sp>
-        <p:nvSpPr>
-          <p:cNvPr id="5" name="Text Placeholder 4">
-            <a:extLst>
-              <a:ext uri="{FF2B5EF4-FFF2-40B4-BE49-F238E27FC236}">
-                <a16:creationId xmlns:a16="http://schemas.microsoft.com/office/drawing/2014/main" id="{40A4408E-3710-6381-D6EF-DB48F4D488CB}"/>
-              </a:ext>
-            </a:extLst>
-          </p:cNvPr>
-          <p:cNvSpPr>
-            <a:spLocks noGrp="1"/>
-          </p:cNvSpPr>
-          <p:nvPr>
-            <p:ph type="body" sz="quarter" idx="17"/>
-          </p:nvPr>
-        </p:nvSpPr>
-        <p:spPr/>
-        <p:txBody>
-          <a:bodyPr/>
-          <a:lstStyle/>
-          <a:p>
-            <a:r>
-              <a:rPr lang="en-US" dirty="0"/>
-              <a:t>Right Column</a:t>
+              <a:t>Title 1</a:t>
             </a:r>
           </a:p>
           <a:p>
@@ -5009,7 +5313,7 @@
     </p:spTree>
     <p:extLst>
       <p:ext uri="{BB962C8B-B14F-4D97-AF65-F5344CB8AC3E}">
-        <p14:creationId xmlns:p14="http://schemas.microsoft.com/office/powerpoint/2010/main" val="2823294671"/>
+        <p14:creationId xmlns:p14="http://schemas.microsoft.com/office/powerpoint/2010/main" val="2420498469"/>
       </p:ext>
     </p:extLst>
   </p:cSld>
@@ -5041,7 +5345,7 @@
           <p:cNvPr id="2" name="Text Placeholder 1">
             <a:extLst>
               <a:ext uri="{FF2B5EF4-FFF2-40B4-BE49-F238E27FC236}">
-                <a16:creationId xmlns:a16="http://schemas.microsoft.com/office/drawing/2014/main" id="{533C955F-6053-E2FC-1585-C4564FF45080}"/>
+                <a16:creationId xmlns:a16="http://schemas.microsoft.com/office/drawing/2014/main" id="{D0CBB279-7909-5F96-1E44-5BCBE95CD5D4}"/>
               </a:ext>
             </a:extLst>
           </p:cNvPr>
@@ -5066,7 +5370,7 @@
           <p:cNvPr id="3" name="Picture Placeholder 2">
             <a:extLst>
               <a:ext uri="{FF2B5EF4-FFF2-40B4-BE49-F238E27FC236}">
-                <a16:creationId xmlns:a16="http://schemas.microsoft.com/office/drawing/2014/main" id="{801D51D8-87C8-4F1A-8B9A-F1AD1A3A4AAF}"/>
+                <a16:creationId xmlns:a16="http://schemas.microsoft.com/office/drawing/2014/main" id="{614EE281-F536-071D-3D0A-724F14AEC19B}"/>
               </a:ext>
             </a:extLst>
           </p:cNvPr>
@@ -5088,6 +5392,156 @@
       </p:sp>
       <p:sp>
         <p:nvSpPr>
+          <p:cNvPr id="4" name="Text Placeholder 3">
+            <a:extLst>
+              <a:ext uri="{FF2B5EF4-FFF2-40B4-BE49-F238E27FC236}">
+                <a16:creationId xmlns:a16="http://schemas.microsoft.com/office/drawing/2014/main" id="{12DF0132-01D6-E174-2D90-F7A6BD857557}"/>
+              </a:ext>
+            </a:extLst>
+          </p:cNvPr>
+          <p:cNvSpPr>
+            <a:spLocks noGrp="1"/>
+          </p:cNvSpPr>
+          <p:nvPr>
+            <p:ph type="body" sz="quarter" idx="16"/>
+          </p:nvPr>
+        </p:nvSpPr>
+        <p:spPr/>
+        <p:txBody>
+          <a:bodyPr/>
+          <a:lstStyle/>
+          <a:p>
+            <a:r>
+              <a:rPr lang="en-US" dirty="0"/>
+              <a:t>Left Column</a:t>
+            </a:r>
+          </a:p>
+          <a:p>
+            <a:pPr lvl="1"/>
+            <a:r>
+              <a:rPr lang="en-US" dirty="0"/>
+              <a:t>Text 1</a:t>
+            </a:r>
+          </a:p>
+        </p:txBody>
+      </p:sp>
+      <p:sp>
+        <p:nvSpPr>
+          <p:cNvPr id="5" name="Text Placeholder 4">
+            <a:extLst>
+              <a:ext uri="{FF2B5EF4-FFF2-40B4-BE49-F238E27FC236}">
+                <a16:creationId xmlns:a16="http://schemas.microsoft.com/office/drawing/2014/main" id="{40A4408E-3710-6381-D6EF-DB48F4D488CB}"/>
+              </a:ext>
+            </a:extLst>
+          </p:cNvPr>
+          <p:cNvSpPr>
+            <a:spLocks noGrp="1"/>
+          </p:cNvSpPr>
+          <p:nvPr>
+            <p:ph type="body" sz="quarter" idx="17"/>
+          </p:nvPr>
+        </p:nvSpPr>
+        <p:spPr/>
+        <p:txBody>
+          <a:bodyPr/>
+          <a:lstStyle/>
+          <a:p>
+            <a:r>
+              <a:rPr lang="en-US" dirty="0"/>
+              <a:t>Right Column</a:t>
+            </a:r>
+          </a:p>
+          <a:p>
+            <a:pPr lvl="1"/>
+            <a:r>
+              <a:rPr lang="en-US" dirty="0"/>
+              <a:t>Text 2</a:t>
+            </a:r>
+          </a:p>
+        </p:txBody>
+      </p:sp>
+    </p:spTree>
+    <p:extLst>
+      <p:ext uri="{BB962C8B-B14F-4D97-AF65-F5344CB8AC3E}">
+        <p14:creationId xmlns:p14="http://schemas.microsoft.com/office/powerpoint/2010/main" val="2823294671"/>
+      </p:ext>
+    </p:extLst>
+  </p:cSld>
+  <p:clrMapOvr>
+    <a:masterClrMapping/>
+  </p:clrMapOvr>
+</p:sld>
+</file>
+
+<file path=ppt/slides/slide6.xml><?xml version="1.0" encoding="utf-8"?>
+<p:sld xmlns:a="http://schemas.openxmlformats.org/drawingml/2006/main" xmlns:r="http://schemas.openxmlformats.org/officeDocument/2006/relationships" xmlns:p="http://schemas.openxmlformats.org/presentationml/2006/main">
+  <p:cSld>
+    <p:spTree>
+      <p:nvGrpSpPr>
+        <p:cNvPr id="1" name=""/>
+        <p:cNvGrpSpPr/>
+        <p:nvPr/>
+      </p:nvGrpSpPr>
+      <p:grpSpPr>
+        <a:xfrm>
+          <a:off x="0" y="0"/>
+          <a:ext cx="0" cy="0"/>
+          <a:chOff x="0" y="0"/>
+          <a:chExt cx="0" cy="0"/>
+        </a:xfrm>
+      </p:grpSpPr>
+      <p:sp>
+        <p:nvSpPr>
+          <p:cNvPr id="2" name="Text Placeholder 1">
+            <a:extLst>
+              <a:ext uri="{FF2B5EF4-FFF2-40B4-BE49-F238E27FC236}">
+                <a16:creationId xmlns:a16="http://schemas.microsoft.com/office/drawing/2014/main" id="{533C955F-6053-E2FC-1585-C4564FF45080}"/>
+              </a:ext>
+            </a:extLst>
+          </p:cNvPr>
+          <p:cNvSpPr>
+            <a:spLocks noGrp="1"/>
+          </p:cNvSpPr>
+          <p:nvPr>
+            <p:ph type="body" sz="quarter" idx="10"/>
+          </p:nvPr>
+        </p:nvSpPr>
+        <p:spPr/>
+        <p:txBody>
+          <a:bodyPr/>
+          <a:lstStyle/>
+          <a:p>
+            <a:endParaRPr lang="en-US"/>
+          </a:p>
+        </p:txBody>
+      </p:sp>
+      <p:sp>
+        <p:nvSpPr>
+          <p:cNvPr id="3" name="Picture Placeholder 2">
+            <a:extLst>
+              <a:ext uri="{FF2B5EF4-FFF2-40B4-BE49-F238E27FC236}">
+                <a16:creationId xmlns:a16="http://schemas.microsoft.com/office/drawing/2014/main" id="{801D51D8-87C8-4F1A-8B9A-F1AD1A3A4AAF}"/>
+              </a:ext>
+            </a:extLst>
+          </p:cNvPr>
+          <p:cNvSpPr>
+            <a:spLocks noGrp="1"/>
+          </p:cNvSpPr>
+          <p:nvPr>
+            <p:ph type="pic" sz="quarter" idx="14"/>
+          </p:nvPr>
+        </p:nvSpPr>
+        <p:spPr/>
+        <p:txBody>
+          <a:bodyPr/>
+          <a:lstStyle/>
+          <a:p>
+            <a:endParaRPr lang="en-US"/>
+          </a:p>
+        </p:txBody>
+      </p:sp>
+      <p:sp>
+        <p:nvSpPr>
           <p:cNvPr id="4" name="Picture Placeholder 3">
             <a:extLst>
               <a:ext uri="{FF2B5EF4-FFF2-40B4-BE49-F238E27FC236}">
@@ -5150,6 +5604,161 @@
     <p:extLst>
       <p:ext uri="{BB962C8B-B14F-4D97-AF65-F5344CB8AC3E}">
         <p14:creationId xmlns:p14="http://schemas.microsoft.com/office/powerpoint/2010/main" val="596696482"/>
+      </p:ext>
+    </p:extLst>
+  </p:cSld>
+  <p:clrMapOvr>
+    <a:masterClrMapping/>
+  </p:clrMapOvr>
+</p:sld>
+</file>
+
+<file path=ppt/slides/slide7.xml><?xml version="1.0" encoding="utf-8"?>
+<p:sld xmlns:a="http://schemas.openxmlformats.org/drawingml/2006/main" xmlns:r="http://schemas.openxmlformats.org/officeDocument/2006/relationships" xmlns:p="http://schemas.openxmlformats.org/presentationml/2006/main">
+  <p:cSld>
+    <p:spTree>
+      <p:nvGrpSpPr>
+        <p:cNvPr id="1" name=""/>
+        <p:cNvGrpSpPr/>
+        <p:nvPr/>
+      </p:nvGrpSpPr>
+      <p:grpSpPr>
+        <a:xfrm>
+          <a:off x="0" y="0"/>
+          <a:ext cx="0" cy="0"/>
+          <a:chOff x="0" y="0"/>
+          <a:chExt cx="0" cy="0"/>
+        </a:xfrm>
+      </p:grpSpPr>
+      <p:sp>
+        <p:nvSpPr>
+          <p:cNvPr id="2" name="Picture Placeholder 1">
+            <a:extLst>
+              <a:ext uri="{FF2B5EF4-FFF2-40B4-BE49-F238E27FC236}">
+                <a16:creationId xmlns:a16="http://schemas.microsoft.com/office/drawing/2014/main" id="{7F9BA52F-5CEE-6460-202B-3D9DD95E3B42}"/>
+              </a:ext>
+            </a:extLst>
+          </p:cNvPr>
+          <p:cNvSpPr>
+            <a:spLocks noGrp="1"/>
+          </p:cNvSpPr>
+          <p:nvPr>
+            <p:ph type="pic" sz="quarter" idx="10"/>
+          </p:nvPr>
+        </p:nvSpPr>
+        <p:spPr/>
+        <p:txBody>
+          <a:bodyPr/>
+          <a:lstStyle/>
+          <a:p>
+            <a:endParaRPr lang="en-US"/>
+          </a:p>
+        </p:txBody>
+      </p:sp>
+      <p:sp>
+        <p:nvSpPr>
+          <p:cNvPr id="3" name="Text Placeholder 2">
+            <a:extLst>
+              <a:ext uri="{FF2B5EF4-FFF2-40B4-BE49-F238E27FC236}">
+                <a16:creationId xmlns:a16="http://schemas.microsoft.com/office/drawing/2014/main" id="{98EF9D11-AA06-AE66-9ADB-22B967B4EF00}"/>
+              </a:ext>
+            </a:extLst>
+          </p:cNvPr>
+          <p:cNvSpPr>
+            <a:spLocks noGrp="1"/>
+          </p:cNvSpPr>
+          <p:nvPr>
+            <p:ph type="body" sz="quarter" idx="12"/>
+          </p:nvPr>
+        </p:nvSpPr>
+        <p:spPr/>
+        <p:txBody>
+          <a:bodyPr/>
+          <a:lstStyle/>
+          <a:p>
+            <a:endParaRPr lang="en-US"/>
+          </a:p>
+        </p:txBody>
+      </p:sp>
+      <p:sp>
+        <p:nvSpPr>
+          <p:cNvPr id="4" name="Picture Placeholder 3">
+            <a:extLst>
+              <a:ext uri="{FF2B5EF4-FFF2-40B4-BE49-F238E27FC236}">
+                <a16:creationId xmlns:a16="http://schemas.microsoft.com/office/drawing/2014/main" id="{1500F8E6-AE2A-780B-E1A9-A9BE49D44DFA}"/>
+              </a:ext>
+            </a:extLst>
+          </p:cNvPr>
+          <p:cNvSpPr>
+            <a:spLocks noGrp="1"/>
+          </p:cNvSpPr>
+          <p:nvPr>
+            <p:ph type="pic" sz="quarter" idx="13"/>
+          </p:nvPr>
+        </p:nvSpPr>
+        <p:spPr/>
+        <p:txBody>
+          <a:bodyPr/>
+          <a:lstStyle/>
+          <a:p>
+            <a:endParaRPr lang="en-US"/>
+          </a:p>
+        </p:txBody>
+      </p:sp>
+      <p:sp>
+        <p:nvSpPr>
+          <p:cNvPr id="5" name="Text Placeholder 4">
+            <a:extLst>
+              <a:ext uri="{FF2B5EF4-FFF2-40B4-BE49-F238E27FC236}">
+                <a16:creationId xmlns:a16="http://schemas.microsoft.com/office/drawing/2014/main" id="{4137B631-C38F-AAA1-879C-2F9420F27911}"/>
+              </a:ext>
+            </a:extLst>
+          </p:cNvPr>
+          <p:cNvSpPr>
+            <a:spLocks noGrp="1"/>
+          </p:cNvSpPr>
+          <p:nvPr>
+            <p:ph type="body" sz="quarter" idx="14"/>
+          </p:nvPr>
+        </p:nvSpPr>
+        <p:spPr/>
+        <p:txBody>
+          <a:bodyPr/>
+          <a:lstStyle/>
+          <a:p>
+            <a:endParaRPr lang="en-US"/>
+          </a:p>
+        </p:txBody>
+      </p:sp>
+      <p:sp>
+        <p:nvSpPr>
+          <p:cNvPr id="6" name="Text Placeholder 5">
+            <a:extLst>
+              <a:ext uri="{FF2B5EF4-FFF2-40B4-BE49-F238E27FC236}">
+                <a16:creationId xmlns:a16="http://schemas.microsoft.com/office/drawing/2014/main" id="{C016555A-A18E-9A63-774B-4A7F78158625}"/>
+              </a:ext>
+            </a:extLst>
+          </p:cNvPr>
+          <p:cNvSpPr>
+            <a:spLocks noGrp="1"/>
+          </p:cNvSpPr>
+          <p:nvPr>
+            <p:ph type="body" sz="quarter" idx="15"/>
+          </p:nvPr>
+        </p:nvSpPr>
+        <p:spPr/>
+        <p:txBody>
+          <a:bodyPr/>
+          <a:lstStyle/>
+          <a:p>
+            <a:endParaRPr lang="en-US"/>
+          </a:p>
+        </p:txBody>
+      </p:sp>
+    </p:spTree>
+    <p:extLst>
+      <p:ext uri="{BB962C8B-B14F-4D97-AF65-F5344CB8AC3E}">
+        <p14:creationId xmlns:p14="http://schemas.microsoft.com/office/powerpoint/2010/main" val="99776141"/>
       </p:ext>
     </p:extLst>
   </p:cSld>

</xml_diff>